<commit_message>
modifications to the hands on to account for mininet
</commit_message>
<xml_diff>
--- a/docs/slides/class/02-Measurement.pptx
+++ b/docs/slides/class/02-Measurement.pptx
@@ -240,7 +240,7 @@
           <a:p>
             <a:fld id="{CEDAEFA1-2302-CF41-B3D2-D7622FF3D015}" type="datetimeFigureOut">
               <a:rPr lang="en-US" smtClean="0"/>
-              <a:t>1/17/23</a:t>
+              <a:t>7/5/24</a:t>
             </a:fld>
             <a:endParaRPr lang="en-US"/>
           </a:p>
@@ -4605,7 +4605,7 @@
           <a:p>
             <a:fld id="{C9E664E8-8019-2444-AEBA-CE692A70D4C8}" type="datetimeFigureOut">
               <a:rPr lang="en-US" smtClean="0"/>
-              <a:t>1/17/23</a:t>
+              <a:t>7/5/24</a:t>
             </a:fld>
             <a:endParaRPr lang="en-US"/>
           </a:p>
@@ -4803,7 +4803,7 @@
           <a:p>
             <a:fld id="{C9E664E8-8019-2444-AEBA-CE692A70D4C8}" type="datetimeFigureOut">
               <a:rPr lang="en-US" smtClean="0"/>
-              <a:t>1/17/23</a:t>
+              <a:t>7/5/24</a:t>
             </a:fld>
             <a:endParaRPr lang="en-US"/>
           </a:p>
@@ -5011,7 +5011,7 @@
           <a:p>
             <a:fld id="{C9E664E8-8019-2444-AEBA-CE692A70D4C8}" type="datetimeFigureOut">
               <a:rPr lang="en-US" smtClean="0"/>
-              <a:t>1/17/23</a:t>
+              <a:t>7/5/24</a:t>
             </a:fld>
             <a:endParaRPr lang="en-US"/>
           </a:p>
@@ -5466,7 +5466,7 @@
           <a:p>
             <a:fld id="{C9E664E8-8019-2444-AEBA-CE692A70D4C8}" type="datetimeFigureOut">
               <a:rPr lang="en-US" smtClean="0"/>
-              <a:t>1/17/23</a:t>
+              <a:t>7/5/24</a:t>
             </a:fld>
             <a:endParaRPr lang="en-US"/>
           </a:p>
@@ -5741,7 +5741,7 @@
           <a:p>
             <a:fld id="{C9E664E8-8019-2444-AEBA-CE692A70D4C8}" type="datetimeFigureOut">
               <a:rPr lang="en-US" smtClean="0"/>
-              <a:t>1/17/23</a:t>
+              <a:t>7/5/24</a:t>
             </a:fld>
             <a:endParaRPr lang="en-US"/>
           </a:p>
@@ -6006,7 +6006,7 @@
           <a:p>
             <a:fld id="{C9E664E8-8019-2444-AEBA-CE692A70D4C8}" type="datetimeFigureOut">
               <a:rPr lang="en-US" smtClean="0"/>
-              <a:t>1/17/23</a:t>
+              <a:t>7/5/24</a:t>
             </a:fld>
             <a:endParaRPr lang="en-US"/>
           </a:p>
@@ -6418,7 +6418,7 @@
           <a:p>
             <a:fld id="{C9E664E8-8019-2444-AEBA-CE692A70D4C8}" type="datetimeFigureOut">
               <a:rPr lang="en-US" smtClean="0"/>
-              <a:t>1/17/23</a:t>
+              <a:t>7/5/24</a:t>
             </a:fld>
             <a:endParaRPr lang="en-US"/>
           </a:p>
@@ -6559,7 +6559,7 @@
           <a:p>
             <a:fld id="{C9E664E8-8019-2444-AEBA-CE692A70D4C8}" type="datetimeFigureOut">
               <a:rPr lang="en-US" smtClean="0"/>
-              <a:t>1/17/23</a:t>
+              <a:t>7/5/24</a:t>
             </a:fld>
             <a:endParaRPr lang="en-US"/>
           </a:p>
@@ -6672,7 +6672,7 @@
           <a:p>
             <a:fld id="{C9E664E8-8019-2444-AEBA-CE692A70D4C8}" type="datetimeFigureOut">
               <a:rPr lang="en-US" smtClean="0"/>
-              <a:t>1/17/23</a:t>
+              <a:t>7/5/24</a:t>
             </a:fld>
             <a:endParaRPr lang="en-US"/>
           </a:p>
@@ -6983,7 +6983,7 @@
           <a:p>
             <a:fld id="{C9E664E8-8019-2444-AEBA-CE692A70D4C8}" type="datetimeFigureOut">
               <a:rPr lang="en-US" smtClean="0"/>
-              <a:t>1/17/23</a:t>
+              <a:t>7/5/24</a:t>
             </a:fld>
             <a:endParaRPr lang="en-US"/>
           </a:p>
@@ -7271,7 +7271,7 @@
           <a:p>
             <a:fld id="{C9E664E8-8019-2444-AEBA-CE692A70D4C8}" type="datetimeFigureOut">
               <a:rPr lang="en-US" smtClean="0"/>
-              <a:t>1/17/23</a:t>
+              <a:t>7/5/24</a:t>
             </a:fld>
             <a:endParaRPr lang="en-US"/>
           </a:p>
@@ -7512,7 +7512,7 @@
           <a:p>
             <a:fld id="{C9E664E8-8019-2444-AEBA-CE692A70D4C8}" type="datetimeFigureOut">
               <a:rPr lang="en-US" smtClean="0"/>
-              <a:t>1/17/23</a:t>
+              <a:t>7/5/24</a:t>
             </a:fld>
             <a:endParaRPr lang="en-US"/>
           </a:p>

</xml_diff>

<commit_message>
reworking the outline, updating book content, etc.
</commit_message>
<xml_diff>
--- a/docs/slides/class/02-Measurement.pptx
+++ b/docs/slides/class/02-Measurement.pptx
@@ -240,7 +240,7 @@
           <a:p>
             <a:fld id="{CEDAEFA1-2302-CF41-B3D2-D7622FF3D015}" type="datetimeFigureOut">
               <a:rPr lang="en-US" smtClean="0"/>
-              <a:t>1/17/23</a:t>
+              <a:t>7/5/24</a:t>
             </a:fld>
             <a:endParaRPr lang="en-US"/>
           </a:p>
@@ -4605,7 +4605,7 @@
           <a:p>
             <a:fld id="{C9E664E8-8019-2444-AEBA-CE692A70D4C8}" type="datetimeFigureOut">
               <a:rPr lang="en-US" smtClean="0"/>
-              <a:t>1/17/23</a:t>
+              <a:t>7/5/24</a:t>
             </a:fld>
             <a:endParaRPr lang="en-US"/>
           </a:p>
@@ -4803,7 +4803,7 @@
           <a:p>
             <a:fld id="{C9E664E8-8019-2444-AEBA-CE692A70D4C8}" type="datetimeFigureOut">
               <a:rPr lang="en-US" smtClean="0"/>
-              <a:t>1/17/23</a:t>
+              <a:t>7/5/24</a:t>
             </a:fld>
             <a:endParaRPr lang="en-US"/>
           </a:p>
@@ -5011,7 +5011,7 @@
           <a:p>
             <a:fld id="{C9E664E8-8019-2444-AEBA-CE692A70D4C8}" type="datetimeFigureOut">
               <a:rPr lang="en-US" smtClean="0"/>
-              <a:t>1/17/23</a:t>
+              <a:t>7/5/24</a:t>
             </a:fld>
             <a:endParaRPr lang="en-US"/>
           </a:p>
@@ -5466,7 +5466,7 @@
           <a:p>
             <a:fld id="{C9E664E8-8019-2444-AEBA-CE692A70D4C8}" type="datetimeFigureOut">
               <a:rPr lang="en-US" smtClean="0"/>
-              <a:t>1/17/23</a:t>
+              <a:t>7/5/24</a:t>
             </a:fld>
             <a:endParaRPr lang="en-US"/>
           </a:p>
@@ -5741,7 +5741,7 @@
           <a:p>
             <a:fld id="{C9E664E8-8019-2444-AEBA-CE692A70D4C8}" type="datetimeFigureOut">
               <a:rPr lang="en-US" smtClean="0"/>
-              <a:t>1/17/23</a:t>
+              <a:t>7/5/24</a:t>
             </a:fld>
             <a:endParaRPr lang="en-US"/>
           </a:p>
@@ -6006,7 +6006,7 @@
           <a:p>
             <a:fld id="{C9E664E8-8019-2444-AEBA-CE692A70D4C8}" type="datetimeFigureOut">
               <a:rPr lang="en-US" smtClean="0"/>
-              <a:t>1/17/23</a:t>
+              <a:t>7/5/24</a:t>
             </a:fld>
             <a:endParaRPr lang="en-US"/>
           </a:p>
@@ -6418,7 +6418,7 @@
           <a:p>
             <a:fld id="{C9E664E8-8019-2444-AEBA-CE692A70D4C8}" type="datetimeFigureOut">
               <a:rPr lang="en-US" smtClean="0"/>
-              <a:t>1/17/23</a:t>
+              <a:t>7/5/24</a:t>
             </a:fld>
             <a:endParaRPr lang="en-US"/>
           </a:p>
@@ -6559,7 +6559,7 @@
           <a:p>
             <a:fld id="{C9E664E8-8019-2444-AEBA-CE692A70D4C8}" type="datetimeFigureOut">
               <a:rPr lang="en-US" smtClean="0"/>
-              <a:t>1/17/23</a:t>
+              <a:t>7/5/24</a:t>
             </a:fld>
             <a:endParaRPr lang="en-US"/>
           </a:p>
@@ -6672,7 +6672,7 @@
           <a:p>
             <a:fld id="{C9E664E8-8019-2444-AEBA-CE692A70D4C8}" type="datetimeFigureOut">
               <a:rPr lang="en-US" smtClean="0"/>
-              <a:t>1/17/23</a:t>
+              <a:t>7/5/24</a:t>
             </a:fld>
             <a:endParaRPr lang="en-US"/>
           </a:p>
@@ -6983,7 +6983,7 @@
           <a:p>
             <a:fld id="{C9E664E8-8019-2444-AEBA-CE692A70D4C8}" type="datetimeFigureOut">
               <a:rPr lang="en-US" smtClean="0"/>
-              <a:t>1/17/23</a:t>
+              <a:t>7/5/24</a:t>
             </a:fld>
             <a:endParaRPr lang="en-US"/>
           </a:p>
@@ -7271,7 +7271,7 @@
           <a:p>
             <a:fld id="{C9E664E8-8019-2444-AEBA-CE692A70D4C8}" type="datetimeFigureOut">
               <a:rPr lang="en-US" smtClean="0"/>
-              <a:t>1/17/23</a:t>
+              <a:t>7/5/24</a:t>
             </a:fld>
             <a:endParaRPr lang="en-US"/>
           </a:p>
@@ -7512,7 +7512,7 @@
           <a:p>
             <a:fld id="{C9E664E8-8019-2444-AEBA-CE692A70D4C8}" type="datetimeFigureOut">
               <a:rPr lang="en-US" smtClean="0"/>
-              <a:t>1/17/23</a:t>
+              <a:t>7/5/24</a:t>
             </a:fld>
             <a:endParaRPr lang="en-US"/>
           </a:p>

</xml_diff>